<commit_message>
Rachel's updated week 7 slides
</commit_message>
<xml_diff>
--- a/help session/week7/week7_ssh.pptx
+++ b/help session/week7/week7_ssh.pptx
@@ -222,7 +222,7 @@
           <a:p>
             <a:fld id="{4D7E51A5-B478-1E40-8CBB-0DAA8831E99D}" type="datetimeFigureOut">
               <a:rPr lang="en-US" smtClean="0"/>
-              <a:t>3/1/21</a:t>
+              <a:t>3/2/2021</a:t>
             </a:fld>
             <a:endParaRPr lang="en-US"/>
           </a:p>
@@ -387,7 +387,7 @@
           <a:p>
             <a:fld id="{D0ED587F-861E-6740-9643-E3DDAE89B8D6}" type="datetimeFigureOut">
               <a:rPr lang="en-US" smtClean="0"/>
-              <a:t>3/1/21</a:t>
+              <a:t>3/2/2021</a:t>
             </a:fld>
             <a:endParaRPr lang="en-US"/>
           </a:p>
@@ -7382,13 +7382,14 @@
             </a:r>
           </a:p>
           <a:p>
-            <a:pPr lvl="2">
+            <a:pPr marL="1399233" lvl="2" indent="0">
               <a:lnSpc>
                 <a:spcPct val="100000"/>
               </a:lnSpc>
               <a:spcAft>
                 <a:spcPts val="0"/>
               </a:spcAft>
+              <a:buNone/>
             </a:pPr>
             <a:endParaRPr lang="en-US" dirty="0"/>
           </a:p>
@@ -7572,7 +7573,7 @@
         </p:nvSpPr>
         <p:spPr>
           <a:xfrm rot="19506453">
-            <a:off x="10216445" y="3016048"/>
+            <a:off x="10216445" y="1754155"/>
             <a:ext cx="3253455" cy="400110"/>
           </a:xfrm>
           <a:prstGeom prst="rect">
@@ -7590,6 +7591,190 @@
               <a:rPr lang="en-US" dirty="0"/>
               <a:t>Ask a TA for help installing!</a:t>
             </a:r>
+          </a:p>
+        </p:txBody>
+      </p:sp>
+      <p:sp>
+        <p:nvSpPr>
+          <p:cNvPr id="7" name="TextBox 6">
+            <a:extLst>
+              <a:ext uri="{FF2B5EF4-FFF2-40B4-BE49-F238E27FC236}">
+                <a16:creationId xmlns:a16="http://schemas.microsoft.com/office/drawing/2014/main" id="{CE907C36-593B-4AB0-9521-30627B70595E}"/>
+              </a:ext>
+            </a:extLst>
+          </p:cNvPr>
+          <p:cNvSpPr txBox="1"/>
+          <p:nvPr/>
+        </p:nvSpPr>
+        <p:spPr>
+          <a:xfrm>
+            <a:off x="6285345" y="3899480"/>
+            <a:ext cx="7707745" cy="1077218"/>
+          </a:xfrm>
+          <a:prstGeom prst="rect">
+            <a:avLst/>
+          </a:prstGeom>
+          <a:noFill/>
+        </p:spPr>
+        <p:txBody>
+          <a:bodyPr wrap="square" rtlCol="0">
+            <a:spAutoFit/>
+          </a:bodyPr>
+          <a:lstStyle/>
+          <a:p>
+            <a:pPr marL="1136875" marR="0" lvl="1" indent="-437261" algn="l" defTabSz="699614" rtl="0" eaLnBrk="1" fontAlgn="auto" latinLnBrk="0" hangingPunct="1">
+              <a:lnSpc>
+                <a:spcPct val="100000"/>
+              </a:lnSpc>
+              <a:spcBef>
+                <a:spcPts val="0"/>
+              </a:spcBef>
+              <a:spcAft>
+                <a:spcPts val="0"/>
+              </a:spcAft>
+              <a:buClrTx/>
+              <a:buSzTx/>
+              <a:buFont typeface="Arial"/>
+              <a:buChar char="–"/>
+              <a:tabLst/>
+              <a:defRPr/>
+            </a:pPr>
+            <a:r>
+              <a:rPr kumimoji="0" lang="en-US" sz="1600" b="0" i="0" u="none" strike="noStrike" kern="1200" cap="none" spc="0" normalizeH="0" baseline="0" noProof="0" dirty="0">
+                <a:ln>
+                  <a:noFill/>
+                </a:ln>
+                <a:solidFill>
+                  <a:srgbClr val="092529"/>
+                </a:solidFill>
+                <a:effectLst/>
+                <a:uLnTx/>
+                <a:uFillTx/>
+                <a:latin typeface="Proxima Nova" charset="0"/>
+              </a:rPr>
+              <a:t>WSL (Windows Subsystem for Linux)</a:t>
+            </a:r>
+          </a:p>
+          <a:p>
+            <a:pPr marL="1749040" marR="0" lvl="2" indent="-349807" algn="l" defTabSz="699614" rtl="0" eaLnBrk="1" fontAlgn="auto" latinLnBrk="0" hangingPunct="1">
+              <a:lnSpc>
+                <a:spcPct val="100000"/>
+              </a:lnSpc>
+              <a:spcBef>
+                <a:spcPts val="0"/>
+              </a:spcBef>
+              <a:spcAft>
+                <a:spcPts val="0"/>
+              </a:spcAft>
+              <a:buClrTx/>
+              <a:buSzTx/>
+              <a:buFont typeface="Arial"/>
+              <a:buChar char="•"/>
+              <a:tabLst/>
+              <a:defRPr/>
+            </a:pPr>
+            <a:r>
+              <a:rPr kumimoji="0" lang="en-US" sz="1600" b="0" i="0" u="none" strike="noStrike" kern="1200" cap="none" spc="0" normalizeH="0" baseline="0" noProof="0" dirty="0">
+                <a:ln>
+                  <a:noFill/>
+                </a:ln>
+                <a:solidFill>
+                  <a:srgbClr val="092529"/>
+                </a:solidFill>
+                <a:effectLst/>
+                <a:uLnTx/>
+                <a:uFillTx/>
+                <a:latin typeface="Proxima Nova" charset="0"/>
+              </a:rPr>
+              <a:t>Simulates Linux on Windows</a:t>
+            </a:r>
+          </a:p>
+          <a:p>
+            <a:pPr marL="1749040" marR="0" lvl="2" indent="-349807" algn="l" defTabSz="699614" rtl="0" eaLnBrk="1" fontAlgn="auto" latinLnBrk="0" hangingPunct="1">
+              <a:lnSpc>
+                <a:spcPct val="100000"/>
+              </a:lnSpc>
+              <a:spcBef>
+                <a:spcPts val="0"/>
+              </a:spcBef>
+              <a:spcAft>
+                <a:spcPts val="0"/>
+              </a:spcAft>
+              <a:buClrTx/>
+              <a:buSzTx/>
+              <a:buFont typeface="Arial"/>
+              <a:buChar char="•"/>
+              <a:tabLst/>
+              <a:defRPr/>
+            </a:pPr>
+            <a:r>
+              <a:rPr kumimoji="0" lang="en-US" sz="1600" b="0" i="0" u="none" strike="noStrike" kern="1200" cap="none" spc="0" normalizeH="0" baseline="0" noProof="0" dirty="0">
+                <a:ln>
+                  <a:noFill/>
+                </a:ln>
+                <a:solidFill>
+                  <a:srgbClr val="092529"/>
+                </a:solidFill>
+                <a:effectLst/>
+                <a:uLnTx/>
+                <a:uFillTx/>
+                <a:latin typeface="Proxima Nova" charset="0"/>
+                <a:hlinkClick r:id="rId4"/>
+              </a:rPr>
+              <a:t>https://docs.microsoft.com/en-us/windows/wsl/install-win10</a:t>
+            </a:r>
+            <a:endParaRPr kumimoji="0" lang="en-US" sz="1600" b="0" i="0" u="none" strike="noStrike" kern="1200" cap="none" spc="0" normalizeH="0" baseline="0" noProof="0" dirty="0">
+              <a:ln>
+                <a:noFill/>
+              </a:ln>
+              <a:solidFill>
+                <a:srgbClr val="092529"/>
+              </a:solidFill>
+              <a:effectLst/>
+              <a:uLnTx/>
+              <a:uFillTx/>
+              <a:latin typeface="Proxima Nova" charset="0"/>
+            </a:endParaRPr>
+          </a:p>
+          <a:p>
+            <a:pPr marL="1749040" marR="0" lvl="2" indent="-349807" algn="l" defTabSz="699614" rtl="0" eaLnBrk="1" fontAlgn="auto" latinLnBrk="0" hangingPunct="1">
+              <a:lnSpc>
+                <a:spcPct val="100000"/>
+              </a:lnSpc>
+              <a:spcBef>
+                <a:spcPts val="0"/>
+              </a:spcBef>
+              <a:spcAft>
+                <a:spcPts val="0"/>
+              </a:spcAft>
+              <a:buClrTx/>
+              <a:buSzTx/>
+              <a:buFont typeface="Arial"/>
+              <a:buChar char="•"/>
+              <a:tabLst/>
+              <a:defRPr/>
+            </a:pPr>
+            <a:r>
+              <a:rPr lang="en-US" sz="1600" dirty="0">
+                <a:solidFill>
+                  <a:srgbClr val="092529"/>
+                </a:solidFill>
+                <a:latin typeface="Proxima Nova" charset="0"/>
+              </a:rPr>
+              <a:t>Follow manual steps</a:t>
+            </a:r>
+            <a:endParaRPr kumimoji="0" lang="en-US" sz="1600" b="0" i="0" u="none" strike="noStrike" kern="1200" cap="none" spc="0" normalizeH="0" baseline="0" noProof="0" dirty="0">
+              <a:ln>
+                <a:noFill/>
+              </a:ln>
+              <a:solidFill>
+                <a:srgbClr val="092529"/>
+              </a:solidFill>
+              <a:effectLst/>
+              <a:uLnTx/>
+              <a:uFillTx/>
+              <a:latin typeface="Proxima Nova" charset="0"/>
+            </a:endParaRPr>
           </a:p>
         </p:txBody>
       </p:sp>

</xml_diff>